<commit_message>
Added Dashboard, improve conclusion and objectives
</commit_message>
<xml_diff>
--- a/PresentaciónTFG_Adrián_Pizarro_Serrano.pptx
+++ b/PresentaciónTFG_Adrián_Pizarro_Serrano.pptx
@@ -27,21 +27,21 @@
   <p:notesSz cx="6858000" cy="9144000"/>
   <p:embeddedFontLst>
     <p:embeddedFont>
-      <p:font typeface="Poppins" panose="020B0604020202020204" charset="0"/>
+      <p:font typeface="Montserrat" panose="020B0604020202020204" charset="0"/>
       <p:regular r:id="rId17"/>
       <p:bold r:id="rId18"/>
       <p:italic r:id="rId19"/>
       <p:boldItalic r:id="rId20"/>
     </p:embeddedFont>
     <p:embeddedFont>
-      <p:font typeface="Montserrat" panose="020B0604020202020204" charset="0"/>
+      <p:font typeface="Montserrat Light" panose="020B0604020202020204" charset="0"/>
       <p:regular r:id="rId21"/>
       <p:bold r:id="rId22"/>
       <p:italic r:id="rId23"/>
       <p:boldItalic r:id="rId24"/>
     </p:embeddedFont>
     <p:embeddedFont>
-      <p:font typeface="Montserrat Light" panose="020B0604020202020204" charset="0"/>
+      <p:font typeface="Poppins" panose="020B0604020202020204" charset="0"/>
       <p:regular r:id="rId25"/>
       <p:bold r:id="rId26"/>
       <p:italic r:id="rId27"/>
@@ -12707,11 +12707,11 @@
           </a:lstStyle>
           <a:p>
             <a:r>
-              <a:rPr lang="es-ES" sz="2400" dirty="0" smtClean="0"/>
+              <a:rPr lang="es-ES" sz="2400" dirty="0"/>
               <a:t>C</a:t>
             </a:r>
             <a:r>
-              <a:rPr lang="es-ES" dirty="0" smtClean="0"/>
+              <a:rPr lang="es-ES" dirty="0"/>
               <a:t>ONCLUSIONES</a:t>
             </a:r>
             <a:endParaRPr lang="es-ES" sz="1000" dirty="0"/>
@@ -13237,7 +13237,7 @@
                 <a:hlinkClick r:id="rId3">
                   <a:extLst>
                     <a:ext uri="{A12FA001-AC4F-418D-AE19-62706E023703}">
-                      <ahyp:hlinkClr xmlns:ahyp="http://schemas.microsoft.com/office/drawing/2018/hyperlinkcolor" xmlns="" val="tx"/>
+                      <ahyp:hlinkClr xmlns:ahyp="http://schemas.microsoft.com/office/drawing/2018/hyperlinkcolor" val="tx"/>
                     </a:ext>
                   </a:extLst>
                 </a:hlinkClick>
@@ -14088,14 +14088,13 @@
           </a:lstStyle>
           <a:p>
             <a:r>
-              <a:rPr lang="es-ES" sz="2400" dirty="0" smtClean="0"/>
+              <a:rPr lang="es-ES" sz="2400" dirty="0"/>
               <a:t>V</a:t>
             </a:r>
             <a:r>
-              <a:rPr lang="es-ES" dirty="0" smtClean="0"/>
+              <a:rPr lang="es-ES" dirty="0"/>
               <a:t>ISUALIZACIÓN DE DATOS</a:t>
             </a:r>
-            <a:endParaRPr lang="es-ES" dirty="0"/>
           </a:p>
         </p:txBody>
       </p:sp>
@@ -14156,7 +14155,6 @@
               <a:rPr lang="es-ES" sz="1800" dirty="0"/>
               <a:t>Consiste en generar un entorno de apariencia real mediante la tecnología. Tiene el fin de hacer sentir al usuario que está dentro del mismo y ofrecerle nuevas posibilidades.</a:t>
             </a:r>
-            <a:endParaRPr lang="es-ES" sz="1800" dirty="0"/>
           </a:p>
         </p:txBody>
       </p:sp>
@@ -14512,14 +14510,13 @@
           </a:lstStyle>
           <a:p>
             <a:r>
-              <a:rPr lang="es-ES" sz="2400" dirty="0" smtClean="0"/>
+              <a:rPr lang="es-ES" sz="2400" dirty="0"/>
               <a:t>R</a:t>
             </a:r>
             <a:r>
-              <a:rPr lang="es-ES" dirty="0" smtClean="0"/>
+              <a:rPr lang="es-ES" dirty="0"/>
               <a:t>EALIDAD VIRTUAL</a:t>
             </a:r>
-            <a:endParaRPr lang="es-ES" dirty="0"/>
           </a:p>
         </p:txBody>
       </p:sp>
@@ -15025,14 +15022,13 @@
           </a:lstStyle>
           <a:p>
             <a:r>
-              <a:rPr lang="es-ES" sz="2400" dirty="0" smtClean="0"/>
+              <a:rPr lang="es-ES" sz="2400" dirty="0"/>
               <a:t>O</a:t>
             </a:r>
             <a:r>
-              <a:rPr lang="es-ES" dirty="0" smtClean="0"/>
+              <a:rPr lang="es-ES" dirty="0"/>
               <a:t>BJETIVOS</a:t>
             </a:r>
-            <a:endParaRPr lang="es-ES" dirty="0"/>
           </a:p>
         </p:txBody>
       </p:sp>
@@ -15096,7 +15092,7 @@
               <a:buNone/>
             </a:pPr>
             <a:r>
-              <a:rPr lang="es-ES" sz="1400" b="1" dirty="0" smtClean="0">
+              <a:rPr lang="es-ES" sz="1400" b="1" dirty="0">
                 <a:latin typeface="Montserrat"/>
                 <a:ea typeface="Montserrat"/>
                 <a:cs typeface="Montserrat"/>
@@ -15105,7 +15101,7 @@
               <a:t>         A-</a:t>
             </a:r>
             <a:r>
-              <a:rPr lang="es-ES" sz="1400" b="1" dirty="0" err="1" smtClean="0">
+              <a:rPr lang="es-ES" sz="1400" b="1" dirty="0" err="1">
                 <a:latin typeface="Montserrat"/>
                 <a:ea typeface="Montserrat"/>
                 <a:cs typeface="Montserrat"/>
@@ -15203,11 +15199,7 @@
             </a:r>
             <a:r>
               <a:rPr lang="es-ES" sz="1400" dirty="0"/>
-              <a:t>Además, sirve para que los navegadores puedan interpretar mejor el código JavaScript </a:t>
-            </a:r>
-            <a:r>
-              <a:rPr lang="es-ES" sz="1400" dirty="0" smtClean="0"/>
-              <a:t>desarrollado.</a:t>
+              <a:t>Además, sirve para que los navegadores puedan interpretar mejor el código JavaScript desarrollado.</a:t>
             </a:r>
             <a:endParaRPr sz="1400" dirty="0"/>
           </a:p>
@@ -15247,7 +15239,7 @@
               </a:spcAft>
               <a:buNone/>
             </a:pPr>
-            <a:endParaRPr lang="es-ES" sz="1400" dirty="0" smtClean="0"/>
+            <a:endParaRPr lang="es-ES" sz="1400" dirty="0"/>
           </a:p>
           <a:p>
             <a:pPr marL="0" lvl="0" indent="0" algn="l" rtl="0">
@@ -15260,20 +15252,8 @@
               <a:buNone/>
             </a:pPr>
             <a:r>
-              <a:rPr lang="es-ES" sz="1400" dirty="0" smtClean="0"/>
-              <a:t>Servidor </a:t>
-            </a:r>
-            <a:r>
               <a:rPr lang="es-ES" sz="1400" dirty="0"/>
-              <a:t>Web </a:t>
-            </a:r>
-            <a:r>
-              <a:rPr lang="es-ES" sz="1400" dirty="0" smtClean="0"/>
-              <a:t>en </a:t>
-            </a:r>
-            <a:r>
-              <a:rPr lang="es-ES" sz="1400" dirty="0"/>
-              <a:t>C++ que nos permite desarrollar en el lado del servidor con JavaScript</a:t>
+              <a:t>Servidor Web en C++ que nos permite desarrollar en el lado del servidor con JavaScript</a:t>
             </a:r>
             <a:r>
               <a:rPr lang="en" sz="1400" dirty="0"/>
@@ -15444,7 +15424,7 @@
               <a:buNone/>
             </a:pPr>
             <a:r>
-              <a:rPr lang="es-ES" sz="1400" b="1" dirty="0" smtClean="0">
+              <a:rPr lang="es-ES" sz="1400" b="1" dirty="0">
                 <a:latin typeface="Montserrat"/>
                 <a:ea typeface="Montserrat"/>
                 <a:cs typeface="Montserrat"/>
@@ -15471,11 +15451,7 @@
             </a:pPr>
             <a:r>
               <a:rPr lang="es-ES" sz="1400" dirty="0"/>
-              <a:t>Lenguaje de marcado para construir páginas web. Nace en 2014 como mejora de HTML incluyendo nuevas etiquetas y mejoras en la </a:t>
-            </a:r>
-            <a:r>
-              <a:rPr lang="es-ES" sz="1400" dirty="0" smtClean="0"/>
-              <a:t>API.</a:t>
+              <a:t>Lenguaje de marcado para construir páginas web. Nace en 2014 como mejora de HTML incluyendo nuevas etiquetas y mejoras en la API.</a:t>
             </a:r>
             <a:endParaRPr sz="1400" dirty="0"/>
           </a:p>
@@ -15510,7 +15486,7 @@
               <a:buNone/>
             </a:pPr>
             <a:r>
-              <a:rPr lang="es-ES" sz="1400" b="1" dirty="0" smtClean="0">
+              <a:rPr lang="es-ES" sz="1400" b="1" dirty="0">
                 <a:latin typeface="Montserrat"/>
                 <a:ea typeface="Montserrat"/>
                 <a:cs typeface="Montserrat"/>
@@ -15839,11 +15815,11 @@
           </a:lstStyle>
           <a:p>
             <a:r>
-              <a:rPr lang="es-ES" sz="2400" dirty="0" smtClean="0"/>
+              <a:rPr lang="es-ES" sz="2400" dirty="0"/>
               <a:t>T</a:t>
             </a:r>
             <a:r>
-              <a:rPr lang="es-ES" dirty="0" smtClean="0"/>
+              <a:rPr lang="es-ES" dirty="0"/>
               <a:t>ECNOLOGÍAS USADAS</a:t>
             </a:r>
             <a:endParaRPr lang="es-ES" sz="1400" dirty="0"/>
@@ -16141,7 +16117,7 @@
         </p:nvGrpSpPr>
         <p:grpSpPr>
           <a:xfrm>
-            <a:off x="4101806" y="925703"/>
+            <a:off x="4564087" y="925703"/>
             <a:ext cx="3867544" cy="2310089"/>
             <a:chOff x="4108032" y="1274925"/>
             <a:chExt cx="3867544" cy="2310089"/>
@@ -16439,377 +16415,7 @@
                     <a:cs typeface="Montserrat"/>
                     <a:sym typeface="Montserrat"/>
                   </a:rPr>
-                  <a:t>Se comienza a trabajar en el API para </a:t>
-                </a:r>
-                <a:r>
-                  <a:rPr lang="es-ES" dirty="0" smtClean="0">
-                    <a:solidFill>
-                      <a:schemeClr val="dk1"/>
-                    </a:solidFill>
-                    <a:latin typeface="Montserrat"/>
-                    <a:ea typeface="Montserrat"/>
-                    <a:cs typeface="Montserrat"/>
-                    <a:sym typeface="Montserrat"/>
-                  </a:rPr>
-                  <a:t>filtrar, </a:t>
-                </a:r>
-                <a:r>
-                  <a:rPr lang="es-ES" dirty="0">
-                    <a:solidFill>
-                      <a:schemeClr val="dk1"/>
-                    </a:solidFill>
-                    <a:latin typeface="Montserrat"/>
-                    <a:ea typeface="Montserrat"/>
-                    <a:cs typeface="Montserrat"/>
-                    <a:sym typeface="Montserrat"/>
-                  </a:rPr>
-                  <a:t>refrescar gráficos de manera dinámica y la inclusión de más visualizaciones y </a:t>
-                </a:r>
-                <a:r>
-                  <a:rPr lang="es-ES" dirty="0" smtClean="0">
-                    <a:solidFill>
-                      <a:schemeClr val="dk1"/>
-                    </a:solidFill>
-                    <a:latin typeface="Montserrat"/>
-                    <a:ea typeface="Montserrat"/>
-                    <a:cs typeface="Montserrat"/>
-                    <a:sym typeface="Montserrat"/>
-                  </a:rPr>
-                  <a:t>configuración</a:t>
-                </a:r>
-                <a:r>
-                  <a:rPr lang="en" dirty="0" smtClean="0">
-                    <a:solidFill>
-                      <a:schemeClr val="dk1"/>
-                    </a:solidFill>
-                    <a:latin typeface="Montserrat"/>
-                    <a:ea typeface="Montserrat"/>
-                    <a:cs typeface="Montserrat"/>
-                    <a:sym typeface="Montserrat"/>
-                  </a:rPr>
-                  <a:t>.</a:t>
-                </a:r>
-                <a:endParaRPr b="1" dirty="0">
-                  <a:solidFill>
-                    <a:schemeClr val="dk1"/>
-                  </a:solidFill>
-                  <a:latin typeface="Montserrat"/>
-                  <a:ea typeface="Montserrat"/>
-                  <a:cs typeface="Montserrat"/>
-                  <a:sym typeface="Montserrat"/>
-                </a:endParaRPr>
-              </a:p>
-            </p:txBody>
-          </p:sp>
-        </p:grpSp>
-      </p:grpSp>
-      <p:grpSp>
-        <p:nvGrpSpPr>
-          <p:cNvPr id="476" name="Google Shape;476;p28"/>
-          <p:cNvGrpSpPr/>
-          <p:nvPr/>
-        </p:nvGrpSpPr>
-        <p:grpSpPr>
-          <a:xfrm>
-            <a:off x="5602014" y="2353368"/>
-            <a:ext cx="3541986" cy="1671435"/>
-            <a:chOff x="5614964" y="2702596"/>
-            <a:chExt cx="3541986" cy="1671435"/>
-          </a:xfrm>
-        </p:grpSpPr>
-        <p:sp>
-          <p:nvSpPr>
-            <p:cNvPr id="477" name="Google Shape;477;p28"/>
-            <p:cNvSpPr/>
-            <p:nvPr/>
-          </p:nvSpPr>
-          <p:spPr>
-            <a:xfrm>
-              <a:off x="6807650" y="3079475"/>
-              <a:ext cx="2349300" cy="133500"/>
-            </a:xfrm>
-            <a:prstGeom prst="rect">
-              <a:avLst/>
-            </a:prstGeom>
-            <a:solidFill>
-              <a:schemeClr val="dk1"/>
-            </a:solidFill>
-            <a:ln>
-              <a:noFill/>
-            </a:ln>
-          </p:spPr>
-          <p:txBody>
-            <a:bodyPr spcFirstLastPara="1" wrap="square" lIns="91425" tIns="91425" rIns="91425" bIns="91425" anchor="ctr" anchorCtr="0">
-              <a:noAutofit/>
-            </a:bodyPr>
-            <a:lstStyle/>
-            <a:p>
-              <a:pPr marL="0" lvl="0" indent="0" algn="l" rtl="0">
-                <a:spcBef>
-                  <a:spcPts val="0"/>
-                </a:spcBef>
-                <a:spcAft>
-                  <a:spcPts val="0"/>
-                </a:spcAft>
-                <a:buNone/>
-              </a:pPr>
-              <a:endParaRPr/>
-            </a:p>
-          </p:txBody>
-        </p:sp>
-        <p:grpSp>
-          <p:nvGrpSpPr>
-            <p:cNvPr id="478" name="Google Shape;478;p28"/>
-            <p:cNvGrpSpPr/>
-            <p:nvPr/>
-          </p:nvGrpSpPr>
-          <p:grpSpPr>
-            <a:xfrm>
-              <a:off x="5614964" y="2702596"/>
-              <a:ext cx="3426372" cy="1671435"/>
-              <a:chOff x="5614964" y="2702596"/>
-              <a:chExt cx="3426372" cy="1671435"/>
-            </a:xfrm>
-          </p:grpSpPr>
-          <p:grpSp>
-            <p:nvGrpSpPr>
-              <p:cNvPr id="479" name="Google Shape;479;p28"/>
-              <p:cNvGrpSpPr/>
-              <p:nvPr/>
-            </p:nvGrpSpPr>
-            <p:grpSpPr>
-              <a:xfrm rot="10800000">
-                <a:off x="6760035" y="3079467"/>
-                <a:ext cx="92400" cy="411825"/>
-                <a:chOff x="2070100" y="2563700"/>
-                <a:chExt cx="92400" cy="411825"/>
-              </a:xfrm>
-            </p:grpSpPr>
-            <p:cxnSp>
-              <p:nvCxnSpPr>
-                <p:cNvPr id="480" name="Google Shape;480;p28"/>
-                <p:cNvCxnSpPr/>
-                <p:nvPr/>
-              </p:nvCxnSpPr>
-              <p:spPr>
-                <a:xfrm>
-                  <a:off x="2116300" y="2616125"/>
-                  <a:ext cx="0" cy="359400"/>
-                </a:xfrm>
-                <a:prstGeom prst="straightConnector1">
-                  <a:avLst/>
-                </a:prstGeom>
-                <a:noFill/>
-                <a:ln w="9525" cap="flat" cmpd="sng">
-                  <a:solidFill>
-                    <a:schemeClr val="dk1"/>
-                  </a:solidFill>
-                  <a:prstDash val="solid"/>
-                  <a:round/>
-                  <a:headEnd type="none" w="sm" len="sm"/>
-                  <a:tailEnd type="none" w="sm" len="sm"/>
-                </a:ln>
-              </p:spPr>
-            </p:cxnSp>
-            <p:sp>
-              <p:nvSpPr>
-                <p:cNvPr id="481" name="Google Shape;481;p28"/>
-                <p:cNvSpPr/>
-                <p:nvPr/>
-              </p:nvSpPr>
-              <p:spPr>
-                <a:xfrm>
-                  <a:off x="2070100" y="2563700"/>
-                  <a:ext cx="92400" cy="92400"/>
-                </a:xfrm>
-                <a:prstGeom prst="ellipse">
-                  <a:avLst/>
-                </a:prstGeom>
-                <a:solidFill>
-                  <a:schemeClr val="dk1"/>
-                </a:solidFill>
-                <a:ln>
-                  <a:noFill/>
-                </a:ln>
-              </p:spPr>
-              <p:txBody>
-                <a:bodyPr spcFirstLastPara="1" wrap="square" lIns="91425" tIns="91425" rIns="91425" bIns="91425" anchor="ctr" anchorCtr="0">
-                  <a:noAutofit/>
-                </a:bodyPr>
-                <a:lstStyle/>
-                <a:p>
-                  <a:pPr marL="0" lvl="0" indent="0" algn="l" rtl="0">
-                    <a:spcBef>
-                      <a:spcPts val="0"/>
-                    </a:spcBef>
-                    <a:spcAft>
-                      <a:spcPts val="0"/>
-                    </a:spcAft>
-                    <a:buNone/>
-                  </a:pPr>
-                  <a:endParaRPr/>
-                </a:p>
-              </p:txBody>
-            </p:sp>
-          </p:grpSp>
-          <p:sp>
-            <p:nvSpPr>
-              <p:cNvPr id="482" name="Google Shape;482;p28"/>
-              <p:cNvSpPr txBox="1"/>
-              <p:nvPr/>
-            </p:nvSpPr>
-            <p:spPr>
-              <a:xfrm>
-                <a:off x="6435809" y="2702596"/>
-                <a:ext cx="825797" cy="371400"/>
-              </a:xfrm>
-              <a:prstGeom prst="rect">
-                <a:avLst/>
-              </a:prstGeom>
-              <a:noFill/>
-              <a:ln>
-                <a:noFill/>
-              </a:ln>
-            </p:spPr>
-            <p:txBody>
-              <a:bodyPr spcFirstLastPara="1" wrap="square" lIns="91425" tIns="91425" rIns="91425" bIns="91425" anchor="t" anchorCtr="0">
-                <a:noAutofit/>
-              </a:bodyPr>
-              <a:lstStyle/>
-              <a:p>
-                <a:pPr marL="0" lvl="0" indent="0" algn="ctr" rtl="0">
-                  <a:lnSpc>
-                    <a:spcPct val="115000"/>
-                  </a:lnSpc>
-                  <a:spcBef>
-                    <a:spcPts val="0"/>
-                  </a:spcBef>
-                  <a:spcAft>
-                    <a:spcPts val="1600"/>
-                  </a:spcAft>
-                  <a:buNone/>
-                </a:pPr>
-                <a:r>
-                  <a:rPr lang="en" sz="1200" b="1" dirty="0">
-                    <a:solidFill>
-                      <a:schemeClr val="dk1"/>
-                    </a:solidFill>
-                    <a:latin typeface="Montserrat"/>
-                    <a:ea typeface="Montserrat"/>
-                    <a:cs typeface="Montserrat"/>
-                    <a:sym typeface="Montserrat"/>
-                  </a:rPr>
-                  <a:t>05/2019</a:t>
-                </a:r>
-                <a:endParaRPr sz="1200" b="1" dirty="0">
-                  <a:solidFill>
-                    <a:schemeClr val="dk1"/>
-                  </a:solidFill>
-                  <a:latin typeface="Montserrat"/>
-                  <a:ea typeface="Montserrat"/>
-                  <a:cs typeface="Montserrat"/>
-                  <a:sym typeface="Montserrat"/>
-                </a:endParaRPr>
-              </a:p>
-            </p:txBody>
-          </p:sp>
-          <p:sp>
-            <p:nvSpPr>
-              <p:cNvPr id="483" name="Google Shape;483;p28"/>
-              <p:cNvSpPr txBox="1"/>
-              <p:nvPr/>
-            </p:nvSpPr>
-            <p:spPr>
-              <a:xfrm>
-                <a:off x="5614964" y="3430231"/>
-                <a:ext cx="3426372" cy="943800"/>
-              </a:xfrm>
-              <a:prstGeom prst="rect">
-                <a:avLst/>
-              </a:prstGeom>
-              <a:noFill/>
-              <a:ln>
-                <a:noFill/>
-              </a:ln>
-            </p:spPr>
-            <p:txBody>
-              <a:bodyPr spcFirstLastPara="1" wrap="square" lIns="91425" tIns="91425" rIns="91425" bIns="91425" anchor="t" anchorCtr="0">
-                <a:noAutofit/>
-              </a:bodyPr>
-              <a:lstStyle/>
-              <a:p>
-                <a:pPr marL="0" lvl="0" indent="0" algn="l" rtl="0">
-                  <a:spcBef>
-                    <a:spcPts val="0"/>
-                  </a:spcBef>
-                  <a:spcAft>
-                    <a:spcPts val="0"/>
-                  </a:spcAft>
-                  <a:buNone/>
-                </a:pPr>
-                <a:r>
-                  <a:rPr lang="es-ES" b="1" dirty="0">
-                    <a:solidFill>
-                      <a:schemeClr val="dk1"/>
-                    </a:solidFill>
-                    <a:latin typeface="Montserrat"/>
-                    <a:ea typeface="Montserrat"/>
-                    <a:cs typeface="Montserrat"/>
-                    <a:sym typeface="Montserrat"/>
-                  </a:rPr>
-                  <a:t>Fin desarrollo del proyecto</a:t>
-                </a:r>
-                <a:endParaRPr b="1" dirty="0">
-                  <a:solidFill>
-                    <a:schemeClr val="dk1"/>
-                  </a:solidFill>
-                  <a:latin typeface="Montserrat"/>
-                  <a:ea typeface="Montserrat"/>
-                  <a:cs typeface="Montserrat"/>
-                  <a:sym typeface="Montserrat"/>
-                </a:endParaRPr>
-              </a:p>
-              <a:p>
-                <a:pPr marL="0" lvl="0" indent="0" algn="l" rtl="0">
-                  <a:spcBef>
-                    <a:spcPts val="0"/>
-                  </a:spcBef>
-                  <a:spcAft>
-                    <a:spcPts val="0"/>
-                  </a:spcAft>
-                  <a:buNone/>
-                </a:pPr>
-                <a:endParaRPr b="1" dirty="0">
-                  <a:solidFill>
-                    <a:schemeClr val="dk1"/>
-                  </a:solidFill>
-                  <a:latin typeface="Montserrat"/>
-                  <a:ea typeface="Montserrat"/>
-                  <a:cs typeface="Montserrat"/>
-                  <a:sym typeface="Montserrat"/>
-                </a:endParaRPr>
-              </a:p>
-              <a:p>
-                <a:pPr marL="0" lvl="0" indent="0" algn="l" rtl="0">
-                  <a:spcBef>
-                    <a:spcPts val="0"/>
-                  </a:spcBef>
-                  <a:spcAft>
-                    <a:spcPts val="1600"/>
-                  </a:spcAft>
-                  <a:buNone/>
-                </a:pPr>
-                <a:r>
-                  <a:rPr lang="es-ES" dirty="0">
-                    <a:solidFill>
-                      <a:schemeClr val="dk1"/>
-                    </a:solidFill>
-                    <a:latin typeface="Montserrat"/>
-                    <a:ea typeface="Montserrat"/>
-                    <a:cs typeface="Montserrat"/>
-                    <a:sym typeface="Montserrat"/>
-                  </a:rPr>
-                  <a:t>Inicio de la documentación y memoria del proyecto, así como realización de una web con demos</a:t>
+                  <a:t>Se comienza a trabajar en el API para filtrar, refrescar gráficos de manera dinámica y la inclusión de más visualizaciones y configuración</a:t>
                 </a:r>
                 <a:r>
                   <a:rPr lang="en" dirty="0">
@@ -16839,16 +16445,295 @@
       </p:grpSp>
       <p:grpSp>
         <p:nvGrpSpPr>
+          <p:cNvPr id="478" name="Google Shape;478;p28"/>
+          <p:cNvGrpSpPr/>
+          <p:nvPr/>
+        </p:nvGrpSpPr>
+        <p:grpSpPr>
+          <a:xfrm>
+            <a:off x="5760228" y="2351205"/>
+            <a:ext cx="3426372" cy="1732509"/>
+            <a:chOff x="5317993" y="2702596"/>
+            <a:chExt cx="3426372" cy="1732509"/>
+          </a:xfrm>
+        </p:grpSpPr>
+        <p:grpSp>
+          <p:nvGrpSpPr>
+            <p:cNvPr id="479" name="Google Shape;479;p28"/>
+            <p:cNvGrpSpPr/>
+            <p:nvPr/>
+          </p:nvGrpSpPr>
+          <p:grpSpPr>
+            <a:xfrm rot="10800000">
+              <a:off x="6760035" y="3079467"/>
+              <a:ext cx="92400" cy="411825"/>
+              <a:chOff x="2070100" y="2563700"/>
+              <a:chExt cx="92400" cy="411825"/>
+            </a:xfrm>
+          </p:grpSpPr>
+          <p:cxnSp>
+            <p:nvCxnSpPr>
+              <p:cNvPr id="480" name="Google Shape;480;p28"/>
+              <p:cNvCxnSpPr/>
+              <p:nvPr/>
+            </p:nvCxnSpPr>
+            <p:spPr>
+              <a:xfrm>
+                <a:off x="2116300" y="2616125"/>
+                <a:ext cx="0" cy="359400"/>
+              </a:xfrm>
+              <a:prstGeom prst="straightConnector1">
+                <a:avLst/>
+              </a:prstGeom>
+              <a:noFill/>
+              <a:ln w="9525" cap="flat" cmpd="sng">
+                <a:solidFill>
+                  <a:schemeClr val="dk1"/>
+                </a:solidFill>
+                <a:prstDash val="solid"/>
+                <a:round/>
+                <a:headEnd type="none" w="sm" len="sm"/>
+                <a:tailEnd type="none" w="sm" len="sm"/>
+              </a:ln>
+            </p:spPr>
+          </p:cxnSp>
+          <p:sp>
+            <p:nvSpPr>
+              <p:cNvPr id="481" name="Google Shape;481;p28"/>
+              <p:cNvSpPr/>
+              <p:nvPr/>
+            </p:nvSpPr>
+            <p:spPr>
+              <a:xfrm>
+                <a:off x="2070100" y="2563700"/>
+                <a:ext cx="92400" cy="92400"/>
+              </a:xfrm>
+              <a:prstGeom prst="ellipse">
+                <a:avLst/>
+              </a:prstGeom>
+              <a:solidFill>
+                <a:schemeClr val="dk1"/>
+              </a:solidFill>
+              <a:ln>
+                <a:noFill/>
+              </a:ln>
+            </p:spPr>
+            <p:txBody>
+              <a:bodyPr spcFirstLastPara="1" wrap="square" lIns="91425" tIns="91425" rIns="91425" bIns="91425" anchor="ctr" anchorCtr="0">
+                <a:noAutofit/>
+              </a:bodyPr>
+              <a:lstStyle/>
+              <a:p>
+                <a:pPr marL="0" lvl="0" indent="0" algn="l" rtl="0">
+                  <a:spcBef>
+                    <a:spcPts val="0"/>
+                  </a:spcBef>
+                  <a:spcAft>
+                    <a:spcPts val="0"/>
+                  </a:spcAft>
+                  <a:buNone/>
+                </a:pPr>
+                <a:endParaRPr/>
+              </a:p>
+            </p:txBody>
+          </p:sp>
+        </p:grpSp>
+        <p:sp>
+          <p:nvSpPr>
+            <p:cNvPr id="482" name="Google Shape;482;p28"/>
+            <p:cNvSpPr txBox="1"/>
+            <p:nvPr/>
+          </p:nvSpPr>
+          <p:spPr>
+            <a:xfrm>
+              <a:off x="6435809" y="2702596"/>
+              <a:ext cx="825797" cy="371400"/>
+            </a:xfrm>
+            <a:prstGeom prst="rect">
+              <a:avLst/>
+            </a:prstGeom>
+            <a:noFill/>
+            <a:ln>
+              <a:noFill/>
+            </a:ln>
+          </p:spPr>
+          <p:txBody>
+            <a:bodyPr spcFirstLastPara="1" wrap="square" lIns="91425" tIns="91425" rIns="91425" bIns="91425" anchor="t" anchorCtr="0">
+              <a:noAutofit/>
+            </a:bodyPr>
+            <a:lstStyle/>
+            <a:p>
+              <a:pPr marL="0" lvl="0" indent="0" algn="ctr" rtl="0">
+                <a:lnSpc>
+                  <a:spcPct val="115000"/>
+                </a:lnSpc>
+                <a:spcBef>
+                  <a:spcPts val="0"/>
+                </a:spcBef>
+                <a:spcAft>
+                  <a:spcPts val="1600"/>
+                </a:spcAft>
+                <a:buNone/>
+              </a:pPr>
+              <a:r>
+                <a:rPr lang="en" sz="1200" b="1" dirty="0">
+                  <a:solidFill>
+                    <a:schemeClr val="dk1"/>
+                  </a:solidFill>
+                  <a:latin typeface="Montserrat"/>
+                  <a:ea typeface="Montserrat"/>
+                  <a:cs typeface="Montserrat"/>
+                  <a:sym typeface="Montserrat"/>
+                </a:rPr>
+                <a:t>05/2019</a:t>
+              </a:r>
+              <a:endParaRPr sz="1200" b="1" dirty="0">
+                <a:solidFill>
+                  <a:schemeClr val="dk1"/>
+                </a:solidFill>
+                <a:latin typeface="Montserrat"/>
+                <a:ea typeface="Montserrat"/>
+                <a:cs typeface="Montserrat"/>
+                <a:sym typeface="Montserrat"/>
+              </a:endParaRPr>
+            </a:p>
+          </p:txBody>
+        </p:sp>
+        <p:sp>
+          <p:nvSpPr>
+            <p:cNvPr id="483" name="Google Shape;483;p28"/>
+            <p:cNvSpPr txBox="1"/>
+            <p:nvPr/>
+          </p:nvSpPr>
+          <p:spPr>
+            <a:xfrm>
+              <a:off x="5317993" y="3491305"/>
+              <a:ext cx="3426372" cy="943800"/>
+            </a:xfrm>
+            <a:prstGeom prst="rect">
+              <a:avLst/>
+            </a:prstGeom>
+            <a:noFill/>
+            <a:ln>
+              <a:noFill/>
+            </a:ln>
+          </p:spPr>
+          <p:txBody>
+            <a:bodyPr spcFirstLastPara="1" wrap="square" lIns="91425" tIns="91425" rIns="91425" bIns="91425" anchor="t" anchorCtr="0">
+              <a:noAutofit/>
+            </a:bodyPr>
+            <a:lstStyle/>
+            <a:p>
+              <a:pPr marL="0" lvl="0" indent="0" algn="l" rtl="0">
+                <a:spcBef>
+                  <a:spcPts val="0"/>
+                </a:spcBef>
+                <a:spcAft>
+                  <a:spcPts val="0"/>
+                </a:spcAft>
+                <a:buNone/>
+              </a:pPr>
+              <a:r>
+                <a:rPr lang="es-ES" b="1" dirty="0">
+                  <a:solidFill>
+                    <a:schemeClr val="dk1"/>
+                  </a:solidFill>
+                  <a:latin typeface="Montserrat"/>
+                  <a:ea typeface="Montserrat"/>
+                  <a:cs typeface="Montserrat"/>
+                  <a:sym typeface="Montserrat"/>
+                </a:rPr>
+                <a:t>Fin desarrollo del proyecto</a:t>
+              </a:r>
+              <a:endParaRPr b="1" dirty="0">
+                <a:solidFill>
+                  <a:schemeClr val="dk1"/>
+                </a:solidFill>
+                <a:latin typeface="Montserrat"/>
+                <a:ea typeface="Montserrat"/>
+                <a:cs typeface="Montserrat"/>
+                <a:sym typeface="Montserrat"/>
+              </a:endParaRPr>
+            </a:p>
+            <a:p>
+              <a:pPr marL="0" lvl="0" indent="0" algn="l" rtl="0">
+                <a:spcBef>
+                  <a:spcPts val="0"/>
+                </a:spcBef>
+                <a:spcAft>
+                  <a:spcPts val="0"/>
+                </a:spcAft>
+                <a:buNone/>
+              </a:pPr>
+              <a:endParaRPr b="1" dirty="0">
+                <a:solidFill>
+                  <a:schemeClr val="dk1"/>
+                </a:solidFill>
+                <a:latin typeface="Montserrat"/>
+                <a:ea typeface="Montserrat"/>
+                <a:cs typeface="Montserrat"/>
+                <a:sym typeface="Montserrat"/>
+              </a:endParaRPr>
+            </a:p>
+            <a:p>
+              <a:pPr marL="0" lvl="0" indent="0" algn="l" rtl="0">
+                <a:spcBef>
+                  <a:spcPts val="0"/>
+                </a:spcBef>
+                <a:spcAft>
+                  <a:spcPts val="1600"/>
+                </a:spcAft>
+                <a:buNone/>
+              </a:pPr>
+              <a:r>
+                <a:rPr lang="es-ES" dirty="0">
+                  <a:solidFill>
+                    <a:schemeClr val="dk1"/>
+                  </a:solidFill>
+                  <a:latin typeface="Montserrat"/>
+                  <a:ea typeface="Montserrat"/>
+                  <a:cs typeface="Montserrat"/>
+                  <a:sym typeface="Montserrat"/>
+                </a:rPr>
+                <a:t>Inicio de la documentación y memoria del proyecto, así como realización de una web con demos</a:t>
+              </a:r>
+              <a:r>
+                <a:rPr lang="en" dirty="0">
+                  <a:solidFill>
+                    <a:schemeClr val="dk1"/>
+                  </a:solidFill>
+                  <a:latin typeface="Montserrat"/>
+                  <a:ea typeface="Montserrat"/>
+                  <a:cs typeface="Montserrat"/>
+                  <a:sym typeface="Montserrat"/>
+                </a:rPr>
+                <a:t>.</a:t>
+              </a:r>
+              <a:endParaRPr b="1" dirty="0">
+                <a:solidFill>
+                  <a:schemeClr val="dk1"/>
+                </a:solidFill>
+                <a:latin typeface="Montserrat"/>
+                <a:ea typeface="Montserrat"/>
+                <a:cs typeface="Montserrat"/>
+                <a:sym typeface="Montserrat"/>
+              </a:endParaRPr>
+            </a:p>
+          </p:txBody>
+        </p:sp>
+      </p:grpSp>
+      <p:grpSp>
+        <p:nvGrpSpPr>
           <p:cNvPr id="484" name="Google Shape;484;p28"/>
           <p:cNvGrpSpPr/>
           <p:nvPr/>
         </p:nvGrpSpPr>
         <p:grpSpPr>
           <a:xfrm>
-            <a:off x="490214" y="920787"/>
-            <a:ext cx="2925648" cy="2315005"/>
-            <a:chOff x="495991" y="1271658"/>
-            <a:chExt cx="2925648" cy="2315005"/>
+            <a:off x="780617" y="927290"/>
+            <a:ext cx="2912072" cy="2308502"/>
+            <a:chOff x="303287" y="1278161"/>
+            <a:chExt cx="2912072" cy="2308502"/>
           </a:xfrm>
         </p:grpSpPr>
         <p:sp>
@@ -16899,10 +16784,10 @@
           </p:nvGrpSpPr>
           <p:grpSpPr>
             <a:xfrm>
-              <a:off x="495991" y="1271658"/>
-              <a:ext cx="2925648" cy="2315005"/>
-              <a:chOff x="495991" y="1271658"/>
-              <a:chExt cx="2925648" cy="2315005"/>
+              <a:off x="303287" y="1278161"/>
+              <a:ext cx="2912072" cy="2308502"/>
+              <a:chOff x="303287" y="1278161"/>
+              <a:chExt cx="2912072" cy="2308502"/>
             </a:xfrm>
           </p:grpSpPr>
           <p:sp>
@@ -17055,7 +16940,7 @@
             </p:nvSpPr>
             <p:spPr>
               <a:xfrm>
-                <a:off x="509567" y="1271658"/>
+                <a:off x="303287" y="1278161"/>
                 <a:ext cx="2912072" cy="943800"/>
               </a:xfrm>
               <a:prstGeom prst="rect">
@@ -17200,10 +17085,10 @@
         </p:nvGrpSpPr>
         <p:grpSpPr>
           <a:xfrm>
-            <a:off x="1959826" y="2351189"/>
-            <a:ext cx="3027455" cy="1669272"/>
-            <a:chOff x="1970382" y="2702596"/>
-            <a:chExt cx="3027455" cy="1669272"/>
+            <a:off x="1670669" y="2353368"/>
+            <a:ext cx="3629090" cy="1729645"/>
+            <a:chOff x="1220262" y="2702596"/>
+            <a:chExt cx="3629090" cy="1729645"/>
           </a:xfrm>
         </p:grpSpPr>
         <p:sp>
@@ -17254,10 +17139,10 @@
           </p:nvGrpSpPr>
           <p:grpSpPr>
             <a:xfrm>
-              <a:off x="1970382" y="2702596"/>
-              <a:ext cx="3027455" cy="1669272"/>
-              <a:chOff x="1970382" y="2702596"/>
-              <a:chExt cx="3027455" cy="1669272"/>
+              <a:off x="1220262" y="2702596"/>
+              <a:ext cx="3027455" cy="1729645"/>
+              <a:chOff x="1220262" y="2702596"/>
+              <a:chExt cx="3027455" cy="1729645"/>
             </a:xfrm>
           </p:grpSpPr>
           <p:sp>
@@ -17410,7 +17295,7 @@
             </p:nvSpPr>
             <p:spPr>
               <a:xfrm>
-                <a:off x="1970382" y="3428068"/>
+                <a:off x="1220262" y="3488441"/>
                 <a:ext cx="3027455" cy="943800"/>
               </a:xfrm>
               <a:prstGeom prst="rect">
@@ -17498,31 +17383,7 @@
                     <a:cs typeface="Montserrat"/>
                     <a:sym typeface="Montserrat"/>
                   </a:rPr>
-                  <a:t>Actualización de la librería y refactorización </a:t>
-                </a:r>
-                <a:r>
-                  <a:rPr lang="es-ES" dirty="0" smtClean="0">
-                    <a:solidFill>
-                      <a:schemeClr val="dk1"/>
-                    </a:solidFill>
-                    <a:latin typeface="Montserrat"/>
-                    <a:ea typeface="Montserrat"/>
-                    <a:cs typeface="Montserrat"/>
-                    <a:sym typeface="Montserrat"/>
-                  </a:rPr>
-                  <a:t>del </a:t>
-                </a:r>
-                <a:r>
-                  <a:rPr lang="es-ES" dirty="0">
-                    <a:solidFill>
-                      <a:schemeClr val="dk1"/>
-                    </a:solidFill>
-                    <a:latin typeface="Montserrat"/>
-                    <a:ea typeface="Montserrat"/>
-                    <a:cs typeface="Montserrat"/>
-                    <a:sym typeface="Montserrat"/>
-                  </a:rPr>
-                  <a:t>código en base a los estándares propuestos por A-</a:t>
+                  <a:t>Actualización de la librería y refactorización del código en base a los estándares propuestos por A-</a:t>
                 </a:r>
                 <a:r>
                   <a:rPr lang="es-ES" dirty="0" err="1">
@@ -17872,11 +17733,11 @@
           </a:lstStyle>
           <a:p>
             <a:r>
-              <a:rPr lang="es-ES" sz="2400" dirty="0" smtClean="0"/>
+              <a:rPr lang="es-ES" sz="2400" dirty="0"/>
               <a:t>F</a:t>
             </a:r>
             <a:r>
-              <a:rPr lang="es-ES" dirty="0" smtClean="0"/>
+              <a:rPr lang="es-ES" dirty="0"/>
               <a:t>ASES DEL PROYECTO</a:t>
             </a:r>
             <a:endParaRPr lang="es-ES" sz="1100" dirty="0"/>
@@ -18074,20 +17935,8 @@
               <a:t>. </a:t>
             </a:r>
             <a:r>
-              <a:rPr lang="es-ES" sz="1800" dirty="0" smtClean="0"/>
-              <a:t>Utilizando </a:t>
-            </a:r>
-            <a:r>
               <a:rPr lang="es-ES" sz="1800" dirty="0"/>
-              <a:t>HTML </a:t>
-            </a:r>
-            <a:r>
-              <a:rPr lang="es-ES" sz="1800" dirty="0" smtClean="0"/>
-              <a:t>y </a:t>
-            </a:r>
-            <a:r>
-              <a:rPr lang="es-ES" sz="1800" dirty="0"/>
-              <a:t>JavaScript en el cliente.</a:t>
+              <a:t>Utilizando HTML y JavaScript en el cliente.</a:t>
             </a:r>
             <a:endParaRPr sz="1800" dirty="0"/>
           </a:p>
@@ -18445,11 +18294,11 @@
           </a:lstStyle>
           <a:p>
             <a:r>
-              <a:rPr lang="es-ES" sz="2400" dirty="0" smtClean="0"/>
+              <a:rPr lang="es-ES" sz="2400" dirty="0"/>
               <a:t>M</a:t>
             </a:r>
             <a:r>
-              <a:rPr lang="es-ES" dirty="0" smtClean="0"/>
+              <a:rPr lang="es-ES" dirty="0"/>
               <a:t>ETODOLOGÍA Y ARQUITECTURA</a:t>
             </a:r>
             <a:endParaRPr lang="es-ES" sz="1000" dirty="0"/>

</xml_diff>